<commit_message>
Updated the slide title
</commit_message>
<xml_diff>
--- a/Lecture-4.pptx
+++ b/Lecture-4.pptx
@@ -217,7 +217,7 @@
           <a:p>
             <a:fld id="{3808ACA3-5BA3-4B05-B235-E1CA96D6F7D6}" type="datetimeFigureOut">
               <a:rPr lang="en-IN" smtClean="0"/>
-              <a:t>07-06-2021</a:t>
+              <a:t>09-06-2021</a:t>
             </a:fld>
             <a:endParaRPr lang="en-IN"/>
           </a:p>
@@ -818,7 +818,7 @@
           <a:p>
             <a:fld id="{95E5B900-8E5A-46AA-A3D8-B7BC7D3436F8}" type="datetimeFigureOut">
               <a:rPr lang="en-IN" smtClean="0"/>
-              <a:t>07-06-2021</a:t>
+              <a:t>09-06-2021</a:t>
             </a:fld>
             <a:endParaRPr lang="en-IN"/>
           </a:p>
@@ -1018,7 +1018,7 @@
           <a:p>
             <a:fld id="{95E5B900-8E5A-46AA-A3D8-B7BC7D3436F8}" type="datetimeFigureOut">
               <a:rPr lang="en-IN" smtClean="0"/>
-              <a:t>07-06-2021</a:t>
+              <a:t>09-06-2021</a:t>
             </a:fld>
             <a:endParaRPr lang="en-IN"/>
           </a:p>
@@ -1228,7 +1228,7 @@
           <a:p>
             <a:fld id="{95E5B900-8E5A-46AA-A3D8-B7BC7D3436F8}" type="datetimeFigureOut">
               <a:rPr lang="en-IN" smtClean="0"/>
-              <a:t>07-06-2021</a:t>
+              <a:t>09-06-2021</a:t>
             </a:fld>
             <a:endParaRPr lang="en-IN"/>
           </a:p>
@@ -1428,7 +1428,7 @@
           <a:p>
             <a:fld id="{95E5B900-8E5A-46AA-A3D8-B7BC7D3436F8}" type="datetimeFigureOut">
               <a:rPr lang="en-IN" smtClean="0"/>
-              <a:t>07-06-2021</a:t>
+              <a:t>09-06-2021</a:t>
             </a:fld>
             <a:endParaRPr lang="en-IN"/>
           </a:p>
@@ -1704,7 +1704,7 @@
           <a:p>
             <a:fld id="{95E5B900-8E5A-46AA-A3D8-B7BC7D3436F8}" type="datetimeFigureOut">
               <a:rPr lang="en-IN" smtClean="0"/>
-              <a:t>07-06-2021</a:t>
+              <a:t>09-06-2021</a:t>
             </a:fld>
             <a:endParaRPr lang="en-IN"/>
           </a:p>
@@ -1972,7 +1972,7 @@
           <a:p>
             <a:fld id="{95E5B900-8E5A-46AA-A3D8-B7BC7D3436F8}" type="datetimeFigureOut">
               <a:rPr lang="en-IN" smtClean="0"/>
-              <a:t>07-06-2021</a:t>
+              <a:t>09-06-2021</a:t>
             </a:fld>
             <a:endParaRPr lang="en-IN"/>
           </a:p>
@@ -2387,7 +2387,7 @@
           <a:p>
             <a:fld id="{95E5B900-8E5A-46AA-A3D8-B7BC7D3436F8}" type="datetimeFigureOut">
               <a:rPr lang="en-IN" smtClean="0"/>
-              <a:t>07-06-2021</a:t>
+              <a:t>09-06-2021</a:t>
             </a:fld>
             <a:endParaRPr lang="en-IN"/>
           </a:p>
@@ -2529,7 +2529,7 @@
           <a:p>
             <a:fld id="{95E5B900-8E5A-46AA-A3D8-B7BC7D3436F8}" type="datetimeFigureOut">
               <a:rPr lang="en-IN" smtClean="0"/>
-              <a:t>07-06-2021</a:t>
+              <a:t>09-06-2021</a:t>
             </a:fld>
             <a:endParaRPr lang="en-IN"/>
           </a:p>
@@ -2642,7 +2642,7 @@
           <a:p>
             <a:fld id="{95E5B900-8E5A-46AA-A3D8-B7BC7D3436F8}" type="datetimeFigureOut">
               <a:rPr lang="en-IN" smtClean="0"/>
-              <a:t>07-06-2021</a:t>
+              <a:t>09-06-2021</a:t>
             </a:fld>
             <a:endParaRPr lang="en-IN"/>
           </a:p>
@@ -2955,7 +2955,7 @@
           <a:p>
             <a:fld id="{95E5B900-8E5A-46AA-A3D8-B7BC7D3436F8}" type="datetimeFigureOut">
               <a:rPr lang="en-IN" smtClean="0"/>
-              <a:t>07-06-2021</a:t>
+              <a:t>09-06-2021</a:t>
             </a:fld>
             <a:endParaRPr lang="en-IN"/>
           </a:p>
@@ -3244,7 +3244,7 @@
           <a:p>
             <a:fld id="{95E5B900-8E5A-46AA-A3D8-B7BC7D3436F8}" type="datetimeFigureOut">
               <a:rPr lang="en-IN" smtClean="0"/>
-              <a:t>07-06-2021</a:t>
+              <a:t>09-06-2021</a:t>
             </a:fld>
             <a:endParaRPr lang="en-IN"/>
           </a:p>
@@ -3487,7 +3487,7 @@
           <a:p>
             <a:fld id="{95E5B900-8E5A-46AA-A3D8-B7BC7D3436F8}" type="datetimeFigureOut">
               <a:rPr lang="en-IN" smtClean="0"/>
-              <a:t>07-06-2021</a:t>
+              <a:t>09-06-2021</a:t>
             </a:fld>
             <a:endParaRPr lang="en-IN"/>
           </a:p>
@@ -3922,14 +3922,16 @@
         </p:nvSpPr>
         <p:spPr/>
         <p:txBody>
-          <a:bodyPr/>
-          <a:lstStyle/>
-          <a:p>
-            <a:r>
-              <a:rPr lang="en-US" dirty="0"/>
-              <a:t>Lecture 4-Python(Functions)</a:t>
-            </a:r>
-            <a:endParaRPr lang="en-IN" dirty="0"/>
+          <a:bodyPr>
+            <a:normAutofit/>
+          </a:bodyPr>
+          <a:lstStyle/>
+          <a:p>
+            <a:r>
+              <a:rPr lang="en-US" sz="4800" dirty="0"/>
+              <a:t>Python - Lecture 4-(Functions)</a:t>
+            </a:r>
+            <a:endParaRPr lang="en-IN" sz="4800" dirty="0"/>
           </a:p>
         </p:txBody>
       </p:sp>

</xml_diff>